<commit_message>
adding updates to slidedecks
</commit_message>
<xml_diff>
--- a/WAC/Stop logging into your servers.pptx
+++ b/WAC/Stop logging into your servers.pptx
@@ -5059,37 +5059,6 @@
           <a:chExt cx="0" cy="0"/>
         </a:xfrm>
       </p:grpSpPr>
-      <p:pic>
-        <p:nvPicPr>
-          <p:cNvPr id="13" name="Picture Placeholder 12" descr="A picture containing doll, toy, automaton&#10;&#10;Description automatically generated">
-            <a:extLst>
-              <a:ext uri="{FF2B5EF4-FFF2-40B4-BE49-F238E27FC236}">
-                <a16:creationId xmlns:a16="http://schemas.microsoft.com/office/drawing/2014/main" id="{62CD6E66-EAB9-E15A-71BD-FB2D4F9AE9AD}"/>
-              </a:ext>
-            </a:extLst>
-          </p:cNvPr>
-          <p:cNvPicPr>
-            <a:picLocks noGrp="1" noChangeAspect="1"/>
-          </p:cNvPicPr>
-          <p:nvPr>
-            <p:ph type="pic" sz="quarter" idx="11"/>
-          </p:nvPr>
-        </p:nvPicPr>
-        <p:blipFill>
-          <a:blip r:embed="rId2">
-            <a:extLst>
-              <a:ext uri="{28A0092B-C50C-407E-A947-70E740481C1C}">
-                <a14:useLocalDpi xmlns:a14="http://schemas.microsoft.com/office/drawing/2010/main" val="0"/>
-              </a:ext>
-            </a:extLst>
-          </a:blip>
-          <a:srcRect t="3053" b="3053"/>
-          <a:stretch>
-            <a:fillRect/>
-          </a:stretch>
-        </p:blipFill>
-        <p:spPr/>
-      </p:pic>
       <p:sp>
         <p:nvSpPr>
           <p:cNvPr id="4" name="Text Placeholder 3">
@@ -5290,7 +5259,7 @@
           <p:nvPr/>
         </p:nvPicPr>
         <p:blipFill>
-          <a:blip r:embed="rId3">
+          <a:blip r:embed="rId2">
             <a:extLst>
               <a:ext uri="{28A0092B-C50C-407E-A947-70E740481C1C}">
                 <a14:useLocalDpi xmlns:a14="http://schemas.microsoft.com/office/drawing/2010/main" val="0"/>
@@ -5326,7 +5295,7 @@
           <p:nvPr/>
         </p:nvPicPr>
         <p:blipFill>
-          <a:blip r:embed="rId3">
+          <a:blip r:embed="rId2">
             <a:extLst>
               <a:ext uri="{28A0092B-C50C-407E-A947-70E740481C1C}">
                 <a14:useLocalDpi xmlns:a14="http://schemas.microsoft.com/office/drawing/2010/main" val="0"/>
@@ -5353,6 +5322,53 @@
             <a:extLst>
               <a:ext uri="{FF2B5EF4-FFF2-40B4-BE49-F238E27FC236}">
                 <a16:creationId xmlns:a16="http://schemas.microsoft.com/office/drawing/2014/main" id="{6E1582B7-8AB6-AA30-86DC-AECE9A56DD85}"/>
+              </a:ext>
+            </a:extLst>
+          </p:cNvPr>
+          <p:cNvPicPr>
+            <a:picLocks noChangeAspect="1" noChangeArrowheads="1"/>
+          </p:cNvPicPr>
+          <p:nvPr/>
+        </p:nvPicPr>
+        <p:blipFill>
+          <a:blip r:embed="rId3">
+            <a:extLst>
+              <a:ext uri="{28A0092B-C50C-407E-A947-70E740481C1C}">
+                <a14:useLocalDpi xmlns:a14="http://schemas.microsoft.com/office/drawing/2010/main" val="0"/>
+              </a:ext>
+            </a:extLst>
+          </a:blip>
+          <a:srcRect/>
+          <a:stretch>
+            <a:fillRect/>
+          </a:stretch>
+        </p:blipFill>
+        <p:spPr bwMode="auto">
+          <a:xfrm>
+            <a:off x="2563062" y="1576946"/>
+            <a:ext cx="2537852" cy="2537852"/>
+          </a:xfrm>
+          <a:prstGeom prst="rect">
+            <a:avLst/>
+          </a:prstGeom>
+          <a:noFill/>
+          <a:extLst>
+            <a:ext uri="{909E8E84-426E-40DD-AFC4-6F175D3DCCD1}">
+              <a14:hiddenFill xmlns:a14="http://schemas.microsoft.com/office/drawing/2010/main">
+                <a:solidFill>
+                  <a:srgbClr val="FFFFFF"/>
+                </a:solidFill>
+              </a14:hiddenFill>
+            </a:ext>
+          </a:extLst>
+        </p:spPr>
+      </p:pic>
+      <p:pic>
+        <p:nvPicPr>
+          <p:cNvPr id="10" name="Picture 2" descr="batch brewer moccamaster classic red">
+            <a:extLst>
+              <a:ext uri="{FF2B5EF4-FFF2-40B4-BE49-F238E27FC236}">
+                <a16:creationId xmlns:a16="http://schemas.microsoft.com/office/drawing/2014/main" id="{C233DFD0-2D33-2538-80CA-304AE21C62D5}"/>
               </a:ext>
             </a:extLst>
           </p:cNvPr>
@@ -5376,7 +5392,7 @@
         </p:blipFill>
         <p:spPr bwMode="auto">
           <a:xfrm>
-            <a:off x="2563062" y="1576946"/>
+            <a:off x="7091088" y="1576946"/>
             <a:ext cx="2537852" cy="2537852"/>
           </a:xfrm>
           <a:prstGeom prst="rect">
@@ -6164,15 +6180,6 @@
 </file>
 
 <file path=customXml/item1.xml><?xml version="1.0" encoding="utf-8"?>
-<?mso-contentType ?>
-<FormTemplates xmlns="http://schemas.microsoft.com/sharepoint/v3/contenttype/forms">
-  <Display>DocumentLibraryForm</Display>
-  <Edit>DocumentLibraryForm</Edit>
-  <New>DocumentLibraryForm</New>
-</FormTemplates>
-</file>
-
-<file path=customXml/item2.xml><?xml version="1.0" encoding="utf-8"?>
 <ct:contentTypeSchema xmlns:ct="http://schemas.microsoft.com/office/2006/metadata/contentType" xmlns:ma="http://schemas.microsoft.com/office/2006/metadata/properties/metaAttributes" ct:_="" ma:_="" ma:contentTypeName="Document" ma:contentTypeID="0x010100066787FB9552CF40BFF026EAAC52FBCA" ma:contentTypeVersion="18" ma:contentTypeDescription="Create a new document." ma:contentTypeScope="" ma:versionID="1683e0f48315e88811cafb8ea3cf965d">
   <xsd:schema xmlns:xsd="http://www.w3.org/2001/XMLSchema" xmlns:xs="http://www.w3.org/2001/XMLSchema" xmlns:p="http://schemas.microsoft.com/office/2006/metadata/properties" xmlns:ns2="0f628621-369a-46c7-83bd-de17ca407533" xmlns:ns3="994c1987-0261-432a-b2ef-a9da39f1b5e2" targetNamespace="http://schemas.microsoft.com/office/2006/metadata/properties" ma:root="true" ma:fieldsID="a1218619feb0f8467992b34858ce2bdd" ns2:_="" ns3:_="">
     <xsd:import namespace="0f628621-369a-46c7-83bd-de17ca407533"/>
@@ -6423,15 +6430,16 @@
 </ct:contentTypeSchema>
 </file>
 
-<file path=customXml/itemProps1.xml><?xml version="1.0" encoding="utf-8"?>
-<ds:datastoreItem xmlns:ds="http://schemas.openxmlformats.org/officeDocument/2006/customXml" ds:itemID="{FBB99CDF-4DD1-4BCA-94A9-937C9978E90C}">
-  <ds:schemaRefs>
-    <ds:schemaRef ds:uri="http://schemas.microsoft.com/sharepoint/v3/contenttype/forms"/>
-  </ds:schemaRefs>
-</ds:datastoreItem>
+<file path=customXml/item2.xml><?xml version="1.0" encoding="utf-8"?>
+<?mso-contentType ?>
+<FormTemplates xmlns="http://schemas.microsoft.com/sharepoint/v3/contenttype/forms">
+  <Display>DocumentLibraryForm</Display>
+  <Edit>DocumentLibraryForm</Edit>
+  <New>DocumentLibraryForm</New>
+</FormTemplates>
 </file>
 
-<file path=customXml/itemProps2.xml><?xml version="1.0" encoding="utf-8"?>
+<file path=customXml/itemProps1.xml><?xml version="1.0" encoding="utf-8"?>
 <ds:datastoreItem xmlns:ds="http://schemas.openxmlformats.org/officeDocument/2006/customXml" ds:itemID="{9A3442F5-7313-42C3-80C5-060E65E825FA}">
   <ds:schemaRefs>
     <ds:schemaRef ds:uri="http://schemas.microsoft.com/office/2006/metadata/contentType"/>
@@ -6448,4 +6456,12 @@
     <ds:schemaRef ds:uri="http://schemas.microsoft.com/internal/obd"/>
   </ds:schemaRefs>
 </ds:datastoreItem>
+</file>
+
+<file path=customXml/itemProps2.xml><?xml version="1.0" encoding="utf-8"?>
+<ds:datastoreItem xmlns:ds="http://schemas.openxmlformats.org/officeDocument/2006/customXml" ds:itemID="{FBB99CDF-4DD1-4BCA-94A9-937C9978E90C}">
+  <ds:schemaRefs>
+    <ds:schemaRef ds:uri="http://schemas.microsoft.com/sharepoint/v3/contenttype/forms"/>
+  </ds:schemaRefs>
+</ds:datastoreItem>
 </file>
</xml_diff>